<commit_message>
Updated Code and Docs
</commit_message>
<xml_diff>
--- a/documentation/Connectorthon_Submission_template.pptx
+++ b/documentation/Connectorthon_Submission_template.pptx
@@ -144,14 +144,6 @@
     </p:ext>
   </p:extLst>
 </p:presentation>
-</file>
-
-<file path=ppt/revisionInfo.xml><?xml version="1.0" encoding="utf-8"?>
-<p1510:revInfo xmlns:a="http://schemas.openxmlformats.org/drawingml/2006/main" xmlns:r="http://schemas.openxmlformats.org/officeDocument/2006/relationships" xmlns:p1510="http://schemas.microsoft.com/office/powerpoint/2015/10/main">
-  <p1510:revLst>
-    <p1510:client id="{3F5D9A57-5C25-4D5B-959E-69D59EDFD516}" v="9" dt="2022-02-02T19:15:26.160"/>
-  </p1510:revLst>
-</p1510:revInfo>
 </file>
 
 <file path=ppt/changesInfos/changesInfo1.xml><?xml version="1.0" encoding="utf-8"?>
@@ -407,6 +399,38 @@
       </pc:sldChg>
     </pc:docChg>
   </pc:docChgLst>
+  <pc:docChgLst>
+    <pc:chgData name="Maya, Sukesh" userId="b367cf50-3d25-45f6-a68d-696afc5b0a2f" providerId="ADAL" clId="{A442ABA1-E7A8-4E44-B3CF-E9B252F77B1F}"/>
+    <pc:docChg chg="custSel modSld">
+      <pc:chgData name="Maya, Sukesh" userId="b367cf50-3d25-45f6-a68d-696afc5b0a2f" providerId="ADAL" clId="{A442ABA1-E7A8-4E44-B3CF-E9B252F77B1F}" dt="2022-02-07T07:00:57.074" v="4" actId="14100"/>
+      <pc:docMkLst>
+        <pc:docMk/>
+      </pc:docMkLst>
+      <pc:sldChg chg="addSp delSp modSp mod">
+        <pc:chgData name="Maya, Sukesh" userId="b367cf50-3d25-45f6-a68d-696afc5b0a2f" providerId="ADAL" clId="{A442ABA1-E7A8-4E44-B3CF-E9B252F77B1F}" dt="2022-02-07T07:00:57.074" v="4" actId="14100"/>
+        <pc:sldMkLst>
+          <pc:docMk/>
+          <pc:sldMk cId="534871839" sldId="370"/>
+        </pc:sldMkLst>
+        <pc:picChg chg="add mod">
+          <ac:chgData name="Maya, Sukesh" userId="b367cf50-3d25-45f6-a68d-696afc5b0a2f" providerId="ADAL" clId="{A442ABA1-E7A8-4E44-B3CF-E9B252F77B1F}" dt="2022-02-07T07:00:57.074" v="4" actId="14100"/>
+          <ac:picMkLst>
+            <pc:docMk/>
+            <pc:sldMk cId="534871839" sldId="370"/>
+            <ac:picMk id="7" creationId="{604BC16D-F5FD-4E0D-BEBB-1AC58816269A}"/>
+          </ac:picMkLst>
+        </pc:picChg>
+        <pc:picChg chg="del">
+          <ac:chgData name="Maya, Sukesh" userId="b367cf50-3d25-45f6-a68d-696afc5b0a2f" providerId="ADAL" clId="{A442ABA1-E7A8-4E44-B3CF-E9B252F77B1F}" dt="2022-02-07T07:00:40.588" v="0" actId="478"/>
+          <ac:picMkLst>
+            <pc:docMk/>
+            <pc:sldMk cId="534871839" sldId="370"/>
+            <ac:picMk id="12" creationId="{4B236DA8-B7BB-4CE7-B91D-399AE96815FC}"/>
+          </ac:picMkLst>
+        </pc:picChg>
+      </pc:sldChg>
+    </pc:docChg>
+  </pc:docChgLst>
 </pc:chgInfo>
 </file>
 
@@ -497,7 +521,7 @@
             <a:fld id="{CFA44459-8680-4AD3-8D18-9EF0845F156E}" type="datetimeFigureOut">
               <a:rPr lang="en-US"/>
               <a:pPr/>
-              <a:t>2/2/2022</a:t>
+              <a:t>2/7/2022</a:t>
             </a:fld>
             <a:endParaRPr lang="en-US" dirty="0"/>
           </a:p>
@@ -1688,7 +1712,7 @@
             <a:fld id="{748832CA-DCD2-41B3-96D1-6E92E8FA8B22}" type="datetime1">
               <a:rPr lang="en-US"/>
               <a:pPr/>
-              <a:t>2/2/2022</a:t>
+              <a:t>2/7/2022</a:t>
             </a:fld>
             <a:endParaRPr lang="en-US" dirty="0"/>
           </a:p>
@@ -3688,7 +3712,7 @@
             <a:fld id="{91D32E29-F823-4652-9AE9-2D2F132296DA}" type="datetime1">
               <a:rPr lang="en-US"/>
               <a:pPr/>
-              <a:t>2/2/2022</a:t>
+              <a:t>2/7/2022</a:t>
             </a:fld>
             <a:endParaRPr lang="en-US" dirty="0"/>
           </a:p>
@@ -4702,7 +4726,7 @@
             <a:fld id="{04A728B0-2EE8-4602-849F-D2D469FDAEE2}" type="datetime1">
               <a:rPr lang="en-US"/>
               <a:pPr/>
-              <a:t>2/2/2022</a:t>
+              <a:t>2/7/2022</a:t>
             </a:fld>
             <a:endParaRPr lang="en-US" dirty="0"/>
           </a:p>
@@ -4972,7 +4996,7 @@
             <a:fld id="{04A728B0-2EE8-4602-849F-D2D469FDAEE2}" type="datetime1">
               <a:rPr lang="en-US"/>
               <a:pPr/>
-              <a:t>2/2/2022</a:t>
+              <a:t>2/7/2022</a:t>
             </a:fld>
             <a:endParaRPr lang="en-US" dirty="0"/>
           </a:p>
@@ -7682,7 +7706,7 @@
             <a:fld id="{04A728B0-2EE8-4602-849F-D2D469FDAEE2}" type="datetime1">
               <a:rPr lang="en-US"/>
               <a:pPr/>
-              <a:t>2/2/2022</a:t>
+              <a:t>2/7/2022</a:t>
             </a:fld>
             <a:endParaRPr lang="en-US" dirty="0"/>
           </a:p>
@@ -10385,7 +10409,7 @@
             <a:fld id="{04A728B0-2EE8-4602-849F-D2D469FDAEE2}" type="datetime1">
               <a:rPr lang="en-US"/>
               <a:pPr/>
-              <a:t>2/2/2022</a:t>
+              <a:t>2/7/2022</a:t>
             </a:fld>
             <a:endParaRPr lang="en-US" dirty="0"/>
           </a:p>
@@ -12850,7 +12874,7 @@
             <a:fld id="{04A728B0-2EE8-4602-849F-D2D469FDAEE2}" type="datetime1">
               <a:rPr lang="en-US"/>
               <a:pPr/>
-              <a:t>2/2/2022</a:t>
+              <a:t>2/7/2022</a:t>
             </a:fld>
             <a:endParaRPr lang="en-US" dirty="0"/>
           </a:p>
@@ -15531,7 +15555,7 @@
             <a:fld id="{E4BC88E4-0D26-41E6-8DE3-67CA588048C0}" type="datetime1">
               <a:rPr lang="en-US"/>
               <a:pPr/>
-              <a:t>2/2/2022</a:t>
+              <a:t>2/7/2022</a:t>
             </a:fld>
             <a:endParaRPr lang="en-US" dirty="0"/>
           </a:p>
@@ -17486,7 +17510,7 @@
             <a:fld id="{A9585ADC-08B8-45FD-80FE-46AC3DB310D7}" type="datetime1">
               <a:rPr lang="en-US"/>
               <a:pPr/>
-              <a:t>2/2/2022</a:t>
+              <a:t>2/7/2022</a:t>
             </a:fld>
             <a:endParaRPr lang="en-US" dirty="0"/>
           </a:p>
@@ -19875,7 +19899,7 @@
           <a:p>
             <a:fld id="{6DEDDF15-459B-4C18-9AB7-2CFC650F197B}" type="datetime1">
               <a:rPr lang="en-US"/>
-              <a:t>2/2/2022</a:t>
+              <a:t>2/7/2022</a:t>
             </a:fld>
             <a:endParaRPr lang="en-US" dirty="0"/>
           </a:p>
@@ -21708,7 +21732,7 @@
             <a:fld id="{04A728B0-2EE8-4602-849F-D2D469FDAEE2}" type="datetime1">
               <a:rPr lang="en-US"/>
               <a:pPr/>
-              <a:t>2/2/2022</a:t>
+              <a:t>2/7/2022</a:t>
             </a:fld>
             <a:endParaRPr lang="en-US" dirty="0"/>
           </a:p>
@@ -22169,7 +22193,7 @@
             <a:fld id="{04A728B0-2EE8-4602-849F-D2D469FDAEE2}" type="datetime1">
               <a:rPr lang="en-US"/>
               <a:pPr/>
-              <a:t>2/2/2022</a:t>
+              <a:t>2/7/2022</a:t>
             </a:fld>
             <a:endParaRPr lang="en-US" dirty="0"/>
           </a:p>
@@ -22490,7 +22514,7 @@
             <a:fld id="{91D32E29-F823-4652-9AE9-2D2F132296DA}" type="datetime1">
               <a:rPr lang="en-US"/>
               <a:pPr/>
-              <a:t>2/2/2022</a:t>
+              <a:t>2/7/2022</a:t>
             </a:fld>
             <a:endParaRPr lang="en-US" dirty="0"/>
           </a:p>
@@ -23072,7 +23096,7 @@
           <a:p>
             <a:fld id="{04A728B0-2EE8-4602-849F-D2D469FDAEE2}" type="datetime1">
               <a:rPr lang="en-US"/>
-              <a:t>2/2/2022</a:t>
+              <a:t>2/7/2022</a:t>
             </a:fld>
             <a:endParaRPr lang="en-US" dirty="0"/>
           </a:p>
@@ -23877,7 +23901,7 @@
             <a:fld id="{04A728B0-2EE8-4602-849F-D2D469FDAEE2}" type="datetime1">
               <a:rPr lang="en-US"/>
               <a:pPr/>
-              <a:t>2/2/2022</a:t>
+              <a:t>2/7/2022</a:t>
             </a:fld>
             <a:endParaRPr lang="en-US" dirty="0"/>
           </a:p>
@@ -24734,7 +24758,7 @@
             <a:fld id="{91D32E29-F823-4652-9AE9-2D2F132296DA}" type="datetime1">
               <a:rPr lang="en-US"/>
               <a:pPr/>
-              <a:t>2/2/2022</a:t>
+              <a:t>2/7/2022</a:t>
             </a:fld>
             <a:endParaRPr lang="en-US" dirty="0"/>
           </a:p>
@@ -25649,7 +25673,7 @@
             <a:fld id="{91D32E29-F823-4652-9AE9-2D2F132296DA}" type="datetime1">
               <a:rPr lang="en-US"/>
               <a:pPr/>
-              <a:t>2/2/2022</a:t>
+              <a:t>2/7/2022</a:t>
             </a:fld>
             <a:endParaRPr lang="en-US" dirty="0"/>
           </a:p>
@@ -26520,7 +26544,7 @@
             <a:fld id="{04A728B0-2EE8-4602-849F-D2D469FDAEE2}" type="datetime1">
               <a:rPr lang="en-US"/>
               <a:pPr/>
-              <a:t>2/2/2022</a:t>
+              <a:t>2/7/2022</a:t>
             </a:fld>
             <a:endParaRPr lang="en-US" dirty="0"/>
           </a:p>
@@ -34721,10 +34745,10 @@
       </p:sp>
       <p:pic>
         <p:nvPicPr>
-          <p:cNvPr id="12" name="Picture 11">
+          <p:cNvPr id="7" name="Picture 6">
             <a:extLst>
               <a:ext uri="{FF2B5EF4-FFF2-40B4-BE49-F238E27FC236}">
-                <a16:creationId xmlns:a16="http://schemas.microsoft.com/office/drawing/2014/main" id="{4B236DA8-B7BB-4CE7-B91D-399AE96815FC}"/>
+                <a16:creationId xmlns:a16="http://schemas.microsoft.com/office/drawing/2014/main" id="{604BC16D-F5FD-4E0D-BEBB-1AC58816269A}"/>
               </a:ext>
             </a:extLst>
           </p:cNvPr>
@@ -34741,8 +34765,8 @@
         </p:blipFill>
         <p:spPr>
           <a:xfrm>
-            <a:off x="361950" y="2086778"/>
-            <a:ext cx="11467350" cy="4100317"/>
+            <a:off x="407368" y="2132856"/>
+            <a:ext cx="11421932" cy="4250422"/>
           </a:xfrm>
           <a:prstGeom prst="rect">
             <a:avLst/>

</xml_diff>